<commit_message>
add word "reverses" to task 3; add more examples
</commit_message>
<xml_diff>
--- a/tasks7.pptx
+++ b/tasks7.pptx
@@ -205,7 +205,7 @@
           <a:p>
             <a:fld id="{60A1A0BD-27CC-4C52-B084-C7D29C3E6A60}" type="datetimeFigureOut">
               <a:rPr lang="en-GB" smtClean="0"/>
-              <a:t>30/08/2021</a:t>
+              <a:t>31/08/2021</a:t>
             </a:fld>
             <a:endParaRPr lang="en-GB"/>
           </a:p>
@@ -622,7 +622,7 @@
           <a:p>
             <a:fld id="{4C324CBA-B5F8-49E4-A74D-FDDDFCEF0F4B}" type="datetimeFigureOut">
               <a:rPr lang="en-GB" smtClean="0"/>
-              <a:t>30/08/2021</a:t>
+              <a:t>31/08/2021</a:t>
             </a:fld>
             <a:endParaRPr lang="en-GB"/>
           </a:p>
@@ -822,7 +822,7 @@
           <a:p>
             <a:fld id="{4C324CBA-B5F8-49E4-A74D-FDDDFCEF0F4B}" type="datetimeFigureOut">
               <a:rPr lang="en-GB" smtClean="0"/>
-              <a:t>30/08/2021</a:t>
+              <a:t>31/08/2021</a:t>
             </a:fld>
             <a:endParaRPr lang="en-GB"/>
           </a:p>
@@ -1032,7 +1032,7 @@
           <a:p>
             <a:fld id="{4C324CBA-B5F8-49E4-A74D-FDDDFCEF0F4B}" type="datetimeFigureOut">
               <a:rPr lang="en-GB" smtClean="0"/>
-              <a:t>30/08/2021</a:t>
+              <a:t>31/08/2021</a:t>
             </a:fld>
             <a:endParaRPr lang="en-GB"/>
           </a:p>
@@ -1232,7 +1232,7 @@
           <a:p>
             <a:fld id="{4C324CBA-B5F8-49E4-A74D-FDDDFCEF0F4B}" type="datetimeFigureOut">
               <a:rPr lang="en-GB" smtClean="0"/>
-              <a:t>30/08/2021</a:t>
+              <a:t>31/08/2021</a:t>
             </a:fld>
             <a:endParaRPr lang="en-GB"/>
           </a:p>
@@ -1508,7 +1508,7 @@
           <a:p>
             <a:fld id="{4C324CBA-B5F8-49E4-A74D-FDDDFCEF0F4B}" type="datetimeFigureOut">
               <a:rPr lang="en-GB" smtClean="0"/>
-              <a:t>30/08/2021</a:t>
+              <a:t>31/08/2021</a:t>
             </a:fld>
             <a:endParaRPr lang="en-GB"/>
           </a:p>
@@ -1776,7 +1776,7 @@
           <a:p>
             <a:fld id="{4C324CBA-B5F8-49E4-A74D-FDDDFCEF0F4B}" type="datetimeFigureOut">
               <a:rPr lang="en-GB" smtClean="0"/>
-              <a:t>30/08/2021</a:t>
+              <a:t>31/08/2021</a:t>
             </a:fld>
             <a:endParaRPr lang="en-GB"/>
           </a:p>
@@ -2191,7 +2191,7 @@
           <a:p>
             <a:fld id="{4C324CBA-B5F8-49E4-A74D-FDDDFCEF0F4B}" type="datetimeFigureOut">
               <a:rPr lang="en-GB" smtClean="0"/>
-              <a:t>30/08/2021</a:t>
+              <a:t>31/08/2021</a:t>
             </a:fld>
             <a:endParaRPr lang="en-GB"/>
           </a:p>
@@ -2333,7 +2333,7 @@
           <a:p>
             <a:fld id="{4C324CBA-B5F8-49E4-A74D-FDDDFCEF0F4B}" type="datetimeFigureOut">
               <a:rPr lang="en-GB" smtClean="0"/>
-              <a:t>30/08/2021</a:t>
+              <a:t>31/08/2021</a:t>
             </a:fld>
             <a:endParaRPr lang="en-GB"/>
           </a:p>
@@ -2446,7 +2446,7 @@
           <a:p>
             <a:fld id="{4C324CBA-B5F8-49E4-A74D-FDDDFCEF0F4B}" type="datetimeFigureOut">
               <a:rPr lang="en-GB" smtClean="0"/>
-              <a:t>30/08/2021</a:t>
+              <a:t>31/08/2021</a:t>
             </a:fld>
             <a:endParaRPr lang="en-GB"/>
           </a:p>
@@ -2759,7 +2759,7 @@
           <a:p>
             <a:fld id="{4C324CBA-B5F8-49E4-A74D-FDDDFCEF0F4B}" type="datetimeFigureOut">
               <a:rPr lang="en-GB" smtClean="0"/>
-              <a:t>30/08/2021</a:t>
+              <a:t>31/08/2021</a:t>
             </a:fld>
             <a:endParaRPr lang="en-GB"/>
           </a:p>
@@ -3048,7 +3048,7 @@
           <a:p>
             <a:fld id="{4C324CBA-B5F8-49E4-A74D-FDDDFCEF0F4B}" type="datetimeFigureOut">
               <a:rPr lang="en-GB" smtClean="0"/>
-              <a:t>30/08/2021</a:t>
+              <a:t>31/08/2021</a:t>
             </a:fld>
             <a:endParaRPr lang="en-GB"/>
           </a:p>
@@ -3293,7 +3293,7 @@
             <a:fld id="{4C324CBA-B5F8-49E4-A74D-FDDDFCEF0F4B}" type="datetimeFigureOut">
               <a:rPr lang="en-GB" smtClean="0"/>
               <a:pPr/>
-              <a:t>30/08/2021</a:t>
+              <a:t>31/08/2021</a:t>
             </a:fld>
             <a:endParaRPr lang="en-GB" dirty="0"/>
           </a:p>
@@ -4345,7 +4345,7 @@
         <p:spPr>
           <a:xfrm>
             <a:off x="696000" y="729000"/>
-            <a:ext cx="10800000" cy="3416320"/>
+            <a:ext cx="10800000" cy="4893647"/>
           </a:xfrm>
           <a:prstGeom prst="rect">
             <a:avLst/>
@@ -4433,7 +4433,7 @@
             </a:r>
             <a:r>
               <a:rPr lang="en-GB" sz="2400" dirty="0"/>
-              <a:t> which takes a vector of vectors and both the overall vector and its elements:</a:t>
+              <a:t> which takes a vector of vectors and reverses both the overall vector and its elements:</a:t>
             </a:r>
             <a:endParaRPr lang="en-GB" sz="2400" dirty="0">
               <a:solidFill>
@@ -4636,6 +4636,80 @@
                 <a:cs typeface="+mj-cs"/>
               </a:rPr>
               <a:t>└────→┴──→┴──→┴──→┘</a:t>
+            </a:r>
+          </a:p>
+          <a:p>
+            <a:r>
+              <a:rPr lang="en-GB" sz="2400" dirty="0">
+                <a:solidFill>
+                  <a:prstClr val="black"/>
+                </a:solidFill>
+                <a:latin typeface="APL385 Unicode" panose="020B0709000202000203" pitchFamily="49" charset="0"/>
+                <a:ea typeface="+mj-ea"/>
+                <a:cs typeface="+mj-cs"/>
+              </a:rPr>
+              <a:t>      ]</a:t>
+            </a:r>
+            <a:r>
+              <a:rPr lang="en-GB" sz="2400" dirty="0" err="1">
+                <a:solidFill>
+                  <a:prstClr val="black"/>
+                </a:solidFill>
+                <a:latin typeface="APL385 Unicode" panose="020B0709000202000203" pitchFamily="49" charset="0"/>
+                <a:ea typeface="+mj-ea"/>
+                <a:cs typeface="+mj-cs"/>
+              </a:rPr>
+              <a:t>disp</a:t>
+            </a:r>
+            <a:r>
+              <a:rPr lang="en-GB" sz="2400" dirty="0">
+                <a:solidFill>
+                  <a:prstClr val="black"/>
+                </a:solidFill>
+                <a:latin typeface="APL385 Unicode" panose="020B0709000202000203" pitchFamily="49" charset="0"/>
+                <a:ea typeface="+mj-ea"/>
+                <a:cs typeface="+mj-cs"/>
+              </a:rPr>
+              <a:t> Backwards (1 2 3)(4 5)(8 2 10)</a:t>
+            </a:r>
+          </a:p>
+          <a:p>
+            <a:r>
+              <a:rPr lang="en-GB" sz="2400" dirty="0">
+                <a:solidFill>
+                  <a:prstClr val="black"/>
+                </a:solidFill>
+                <a:latin typeface="APL385 Unicode" panose="020B0709000202000203" pitchFamily="49" charset="0"/>
+                <a:ea typeface="+mj-ea"/>
+                <a:cs typeface="+mj-cs"/>
+              </a:rPr>
+              <a:t>┌→─────┬───┬─────┐</a:t>
+            </a:r>
+          </a:p>
+          <a:p>
+            <a:r>
+              <a:rPr lang="en-GB" sz="2400" dirty="0">
+                <a:solidFill>
+                  <a:prstClr val="black"/>
+                </a:solidFill>
+                <a:latin typeface="APL385 Unicode" panose="020B0709000202000203" pitchFamily="49" charset="0"/>
+                <a:ea typeface="+mj-ea"/>
+                <a:cs typeface="+mj-cs"/>
+              </a:rPr>
+              <a:t>│10 2 8│5 4│3 2 1│</a:t>
+            </a:r>
+          </a:p>
+          <a:p>
+            <a:r>
+              <a:rPr lang="en-GB" sz="2400" dirty="0">
+                <a:solidFill>
+                  <a:prstClr val="black"/>
+                </a:solidFill>
+                <a:latin typeface="APL385 Unicode" panose="020B0709000202000203" pitchFamily="49" charset="0"/>
+                <a:ea typeface="+mj-ea"/>
+                <a:cs typeface="+mj-cs"/>
+              </a:rPr>
+              <a:t>└~────→┴~─→┴~───→┘</a:t>
             </a:r>
           </a:p>
         </p:txBody>
@@ -5304,7 +5378,7 @@
         <p:spPr>
           <a:xfrm>
             <a:off x="696000" y="729000"/>
-            <a:ext cx="10800000" cy="3785652"/>
+            <a:ext cx="10800000" cy="4524315"/>
           </a:xfrm>
           <a:prstGeom prst="rect">
             <a:avLst/>
@@ -5464,6 +5538,40 @@
               </a:rPr>
               <a:t>3 6 9</a:t>
             </a:r>
+          </a:p>
+          <a:p>
+            <a:r>
+              <a:rPr lang="en-US" sz="2400" dirty="0">
+                <a:solidFill>
+                  <a:prstClr val="black"/>
+                </a:solidFill>
+                <a:latin typeface="APL385 Unicode" panose="020B0709000202000203" pitchFamily="49" charset="0"/>
+                <a:ea typeface="+mj-ea"/>
+                <a:cs typeface="+mj-cs"/>
+              </a:rPr>
+              <a:t>      'B' From (3 3⍴'ABC',3 5 1 3 4 2)</a:t>
+            </a:r>
+          </a:p>
+          <a:p>
+            <a:r>
+              <a:rPr lang="en-US" sz="2400" dirty="0">
+                <a:solidFill>
+                  <a:prstClr val="black"/>
+                </a:solidFill>
+                <a:latin typeface="APL385 Unicode" panose="020B0709000202000203" pitchFamily="49" charset="0"/>
+                <a:ea typeface="+mj-ea"/>
+                <a:cs typeface="+mj-cs"/>
+              </a:rPr>
+              <a:t>5 4</a:t>
+            </a:r>
+            <a:endParaRPr lang="en-GB" sz="2400" dirty="0">
+              <a:solidFill>
+                <a:prstClr val="black"/>
+              </a:solidFill>
+              <a:latin typeface="APL385 Unicode" panose="020B0709000202000203" pitchFamily="49" charset="0"/>
+              <a:ea typeface="+mj-ea"/>
+              <a:cs typeface="+mj-cs"/>
+            </a:endParaRPr>
           </a:p>
         </p:txBody>
       </p:sp>
@@ -5512,7 +5620,7 @@
         <p:spPr>
           <a:xfrm>
             <a:off x="696000" y="729000"/>
-            <a:ext cx="10800000" cy="3416320"/>
+            <a:ext cx="10800000" cy="4893647"/>
           </a:xfrm>
           <a:prstGeom prst="rect">
             <a:avLst/>
@@ -5751,6 +5859,154 @@
               </a:rPr>
               <a:t>0</a:t>
             </a:r>
+          </a:p>
+          <a:p>
+            <a:r>
+              <a:rPr lang="en-US" sz="2400" dirty="0">
+                <a:solidFill>
+                  <a:prstClr val="black"/>
+                </a:solidFill>
+                <a:latin typeface="APL385 Unicode" panose="020B0709000202000203" pitchFamily="49" charset="0"/>
+                <a:ea typeface="+mj-ea"/>
+                <a:cs typeface="+mj-cs"/>
+              </a:rPr>
+              <a:t>      'apple' </a:t>
+            </a:r>
+            <a:r>
+              <a:rPr lang="en-US" sz="2400" dirty="0" err="1">
+                <a:solidFill>
+                  <a:prstClr val="black"/>
+                </a:solidFill>
+                <a:latin typeface="APL385 Unicode" panose="020B0709000202000203" pitchFamily="49" charset="0"/>
+                <a:ea typeface="+mj-ea"/>
+                <a:cs typeface="+mj-cs"/>
+              </a:rPr>
+              <a:t>RotationOf</a:t>
+            </a:r>
+            <a:r>
+              <a:rPr lang="en-US" sz="2400" dirty="0">
+                <a:solidFill>
+                  <a:prstClr val="black"/>
+                </a:solidFill>
+                <a:latin typeface="APL385 Unicode" panose="020B0709000202000203" pitchFamily="49" charset="0"/>
+                <a:ea typeface="+mj-ea"/>
+                <a:cs typeface="+mj-cs"/>
+              </a:rPr>
+              <a:t> '</a:t>
+            </a:r>
+            <a:r>
+              <a:rPr lang="en-US" sz="2400" dirty="0" err="1">
+                <a:solidFill>
+                  <a:prstClr val="black"/>
+                </a:solidFill>
+                <a:latin typeface="APL385 Unicode" panose="020B0709000202000203" pitchFamily="49" charset="0"/>
+                <a:ea typeface="+mj-ea"/>
+                <a:cs typeface="+mj-cs"/>
+              </a:rPr>
+              <a:t>leapp</a:t>
+            </a:r>
+            <a:r>
+              <a:rPr lang="en-US" sz="2400" dirty="0">
+                <a:solidFill>
+                  <a:prstClr val="black"/>
+                </a:solidFill>
+                <a:latin typeface="APL385 Unicode" panose="020B0709000202000203" pitchFamily="49" charset="0"/>
+                <a:ea typeface="+mj-ea"/>
+                <a:cs typeface="+mj-cs"/>
+              </a:rPr>
+              <a:t>'</a:t>
+            </a:r>
+          </a:p>
+          <a:p>
+            <a:r>
+              <a:rPr lang="en-US" sz="2400" dirty="0">
+                <a:solidFill>
+                  <a:prstClr val="black"/>
+                </a:solidFill>
+                <a:latin typeface="APL385 Unicode" panose="020B0709000202000203" pitchFamily="49" charset="0"/>
+                <a:ea typeface="+mj-ea"/>
+                <a:cs typeface="+mj-cs"/>
+              </a:rPr>
+              <a:t>1</a:t>
+            </a:r>
+          </a:p>
+          <a:p>
+            <a:r>
+              <a:rPr lang="en-US" sz="2400" dirty="0">
+                <a:solidFill>
+                  <a:prstClr val="black"/>
+                </a:solidFill>
+                <a:latin typeface="APL385 Unicode" panose="020B0709000202000203" pitchFamily="49" charset="0"/>
+                <a:ea typeface="+mj-ea"/>
+                <a:cs typeface="+mj-cs"/>
+              </a:rPr>
+              <a:t>      'pepper' </a:t>
+            </a:r>
+            <a:r>
+              <a:rPr lang="en-US" sz="2400" dirty="0" err="1">
+                <a:solidFill>
+                  <a:prstClr val="black"/>
+                </a:solidFill>
+                <a:latin typeface="APL385 Unicode" panose="020B0709000202000203" pitchFamily="49" charset="0"/>
+                <a:ea typeface="+mj-ea"/>
+                <a:cs typeface="+mj-cs"/>
+              </a:rPr>
+              <a:t>RotationOf</a:t>
+            </a:r>
+            <a:r>
+              <a:rPr lang="en-US" sz="2400" dirty="0">
+                <a:solidFill>
+                  <a:prstClr val="black"/>
+                </a:solidFill>
+                <a:latin typeface="APL385 Unicode" panose="020B0709000202000203" pitchFamily="49" charset="0"/>
+                <a:ea typeface="+mj-ea"/>
+                <a:cs typeface="+mj-cs"/>
+              </a:rPr>
+              <a:t> '</a:t>
+            </a:r>
+            <a:r>
+              <a:rPr lang="en-US" sz="2400" dirty="0" err="1">
+                <a:solidFill>
+                  <a:prstClr val="black"/>
+                </a:solidFill>
+                <a:latin typeface="APL385 Unicode" panose="020B0709000202000203" pitchFamily="49" charset="0"/>
+                <a:ea typeface="+mj-ea"/>
+                <a:cs typeface="+mj-cs"/>
+              </a:rPr>
+              <a:t>repppe</a:t>
+            </a:r>
+            <a:r>
+              <a:rPr lang="en-US" sz="2400" dirty="0">
+                <a:solidFill>
+                  <a:prstClr val="black"/>
+                </a:solidFill>
+                <a:latin typeface="APL385 Unicode" panose="020B0709000202000203" pitchFamily="49" charset="0"/>
+                <a:ea typeface="+mj-ea"/>
+                <a:cs typeface="+mj-cs"/>
+              </a:rPr>
+              <a:t>'</a:t>
+            </a:r>
+          </a:p>
+          <a:p>
+            <a:r>
+              <a:rPr lang="en-US" sz="2400" dirty="0">
+                <a:solidFill>
+                  <a:prstClr val="black"/>
+                </a:solidFill>
+                <a:latin typeface="APL385 Unicode" panose="020B0709000202000203" pitchFamily="49" charset="0"/>
+                <a:ea typeface="+mj-ea"/>
+                <a:cs typeface="+mj-cs"/>
+              </a:rPr>
+              <a:t>0</a:t>
+            </a:r>
+            <a:endParaRPr lang="en-GB" sz="2400" dirty="0">
+              <a:solidFill>
+                <a:prstClr val="black"/>
+              </a:solidFill>
+              <a:latin typeface="APL385 Unicode" panose="020B0709000202000203" pitchFamily="49" charset="0"/>
+              <a:ea typeface="+mj-ea"/>
+              <a:cs typeface="+mj-cs"/>
+            </a:endParaRPr>
           </a:p>
         </p:txBody>
       </p:sp>

</xml_diff>

<commit_message>
add word "reverses" to task 3; add more example uses (#4)
* submission instructions; fix task 16

* clarify task 13

* fix task 13 etc. examples

* Day 9 summary notes

* add word "reverses" to task 3; add more examples
</commit_message>
<xml_diff>
--- a/tasks7.pptx
+++ b/tasks7.pptx
@@ -205,7 +205,7 @@
           <a:p>
             <a:fld id="{60A1A0BD-27CC-4C52-B084-C7D29C3E6A60}" type="datetimeFigureOut">
               <a:rPr lang="en-GB" smtClean="0"/>
-              <a:t>30/08/2021</a:t>
+              <a:t>31/08/2021</a:t>
             </a:fld>
             <a:endParaRPr lang="en-GB"/>
           </a:p>
@@ -622,7 +622,7 @@
           <a:p>
             <a:fld id="{4C324CBA-B5F8-49E4-A74D-FDDDFCEF0F4B}" type="datetimeFigureOut">
               <a:rPr lang="en-GB" smtClean="0"/>
-              <a:t>30/08/2021</a:t>
+              <a:t>31/08/2021</a:t>
             </a:fld>
             <a:endParaRPr lang="en-GB"/>
           </a:p>
@@ -822,7 +822,7 @@
           <a:p>
             <a:fld id="{4C324CBA-B5F8-49E4-A74D-FDDDFCEF0F4B}" type="datetimeFigureOut">
               <a:rPr lang="en-GB" smtClean="0"/>
-              <a:t>30/08/2021</a:t>
+              <a:t>31/08/2021</a:t>
             </a:fld>
             <a:endParaRPr lang="en-GB"/>
           </a:p>
@@ -1032,7 +1032,7 @@
           <a:p>
             <a:fld id="{4C324CBA-B5F8-49E4-A74D-FDDDFCEF0F4B}" type="datetimeFigureOut">
               <a:rPr lang="en-GB" smtClean="0"/>
-              <a:t>30/08/2021</a:t>
+              <a:t>31/08/2021</a:t>
             </a:fld>
             <a:endParaRPr lang="en-GB"/>
           </a:p>
@@ -1232,7 +1232,7 @@
           <a:p>
             <a:fld id="{4C324CBA-B5F8-49E4-A74D-FDDDFCEF0F4B}" type="datetimeFigureOut">
               <a:rPr lang="en-GB" smtClean="0"/>
-              <a:t>30/08/2021</a:t>
+              <a:t>31/08/2021</a:t>
             </a:fld>
             <a:endParaRPr lang="en-GB"/>
           </a:p>
@@ -1508,7 +1508,7 @@
           <a:p>
             <a:fld id="{4C324CBA-B5F8-49E4-A74D-FDDDFCEF0F4B}" type="datetimeFigureOut">
               <a:rPr lang="en-GB" smtClean="0"/>
-              <a:t>30/08/2021</a:t>
+              <a:t>31/08/2021</a:t>
             </a:fld>
             <a:endParaRPr lang="en-GB"/>
           </a:p>
@@ -1776,7 +1776,7 @@
           <a:p>
             <a:fld id="{4C324CBA-B5F8-49E4-A74D-FDDDFCEF0F4B}" type="datetimeFigureOut">
               <a:rPr lang="en-GB" smtClean="0"/>
-              <a:t>30/08/2021</a:t>
+              <a:t>31/08/2021</a:t>
             </a:fld>
             <a:endParaRPr lang="en-GB"/>
           </a:p>
@@ -2191,7 +2191,7 @@
           <a:p>
             <a:fld id="{4C324CBA-B5F8-49E4-A74D-FDDDFCEF0F4B}" type="datetimeFigureOut">
               <a:rPr lang="en-GB" smtClean="0"/>
-              <a:t>30/08/2021</a:t>
+              <a:t>31/08/2021</a:t>
             </a:fld>
             <a:endParaRPr lang="en-GB"/>
           </a:p>
@@ -2333,7 +2333,7 @@
           <a:p>
             <a:fld id="{4C324CBA-B5F8-49E4-A74D-FDDDFCEF0F4B}" type="datetimeFigureOut">
               <a:rPr lang="en-GB" smtClean="0"/>
-              <a:t>30/08/2021</a:t>
+              <a:t>31/08/2021</a:t>
             </a:fld>
             <a:endParaRPr lang="en-GB"/>
           </a:p>
@@ -2446,7 +2446,7 @@
           <a:p>
             <a:fld id="{4C324CBA-B5F8-49E4-A74D-FDDDFCEF0F4B}" type="datetimeFigureOut">
               <a:rPr lang="en-GB" smtClean="0"/>
-              <a:t>30/08/2021</a:t>
+              <a:t>31/08/2021</a:t>
             </a:fld>
             <a:endParaRPr lang="en-GB"/>
           </a:p>
@@ -2759,7 +2759,7 @@
           <a:p>
             <a:fld id="{4C324CBA-B5F8-49E4-A74D-FDDDFCEF0F4B}" type="datetimeFigureOut">
               <a:rPr lang="en-GB" smtClean="0"/>
-              <a:t>30/08/2021</a:t>
+              <a:t>31/08/2021</a:t>
             </a:fld>
             <a:endParaRPr lang="en-GB"/>
           </a:p>
@@ -3048,7 +3048,7 @@
           <a:p>
             <a:fld id="{4C324CBA-B5F8-49E4-A74D-FDDDFCEF0F4B}" type="datetimeFigureOut">
               <a:rPr lang="en-GB" smtClean="0"/>
-              <a:t>30/08/2021</a:t>
+              <a:t>31/08/2021</a:t>
             </a:fld>
             <a:endParaRPr lang="en-GB"/>
           </a:p>
@@ -3293,7 +3293,7 @@
             <a:fld id="{4C324CBA-B5F8-49E4-A74D-FDDDFCEF0F4B}" type="datetimeFigureOut">
               <a:rPr lang="en-GB" smtClean="0"/>
               <a:pPr/>
-              <a:t>30/08/2021</a:t>
+              <a:t>31/08/2021</a:t>
             </a:fld>
             <a:endParaRPr lang="en-GB" dirty="0"/>
           </a:p>
@@ -4345,7 +4345,7 @@
         <p:spPr>
           <a:xfrm>
             <a:off x="696000" y="729000"/>
-            <a:ext cx="10800000" cy="3416320"/>
+            <a:ext cx="10800000" cy="4893647"/>
           </a:xfrm>
           <a:prstGeom prst="rect">
             <a:avLst/>
@@ -4433,7 +4433,7 @@
             </a:r>
             <a:r>
               <a:rPr lang="en-GB" sz="2400" dirty="0"/>
-              <a:t> which takes a vector of vectors and both the overall vector and its elements:</a:t>
+              <a:t> which takes a vector of vectors and reverses both the overall vector and its elements:</a:t>
             </a:r>
             <a:endParaRPr lang="en-GB" sz="2400" dirty="0">
               <a:solidFill>
@@ -4636,6 +4636,80 @@
                 <a:cs typeface="+mj-cs"/>
               </a:rPr>
               <a:t>└────→┴──→┴──→┴──→┘</a:t>
+            </a:r>
+          </a:p>
+          <a:p>
+            <a:r>
+              <a:rPr lang="en-GB" sz="2400" dirty="0">
+                <a:solidFill>
+                  <a:prstClr val="black"/>
+                </a:solidFill>
+                <a:latin typeface="APL385 Unicode" panose="020B0709000202000203" pitchFamily="49" charset="0"/>
+                <a:ea typeface="+mj-ea"/>
+                <a:cs typeface="+mj-cs"/>
+              </a:rPr>
+              <a:t>      ]</a:t>
+            </a:r>
+            <a:r>
+              <a:rPr lang="en-GB" sz="2400" dirty="0" err="1">
+                <a:solidFill>
+                  <a:prstClr val="black"/>
+                </a:solidFill>
+                <a:latin typeface="APL385 Unicode" panose="020B0709000202000203" pitchFamily="49" charset="0"/>
+                <a:ea typeface="+mj-ea"/>
+                <a:cs typeface="+mj-cs"/>
+              </a:rPr>
+              <a:t>disp</a:t>
+            </a:r>
+            <a:r>
+              <a:rPr lang="en-GB" sz="2400" dirty="0">
+                <a:solidFill>
+                  <a:prstClr val="black"/>
+                </a:solidFill>
+                <a:latin typeface="APL385 Unicode" panose="020B0709000202000203" pitchFamily="49" charset="0"/>
+                <a:ea typeface="+mj-ea"/>
+                <a:cs typeface="+mj-cs"/>
+              </a:rPr>
+              <a:t> Backwards (1 2 3)(4 5)(8 2 10)</a:t>
+            </a:r>
+          </a:p>
+          <a:p>
+            <a:r>
+              <a:rPr lang="en-GB" sz="2400" dirty="0">
+                <a:solidFill>
+                  <a:prstClr val="black"/>
+                </a:solidFill>
+                <a:latin typeface="APL385 Unicode" panose="020B0709000202000203" pitchFamily="49" charset="0"/>
+                <a:ea typeface="+mj-ea"/>
+                <a:cs typeface="+mj-cs"/>
+              </a:rPr>
+              <a:t>┌→─────┬───┬─────┐</a:t>
+            </a:r>
+          </a:p>
+          <a:p>
+            <a:r>
+              <a:rPr lang="en-GB" sz="2400" dirty="0">
+                <a:solidFill>
+                  <a:prstClr val="black"/>
+                </a:solidFill>
+                <a:latin typeface="APL385 Unicode" panose="020B0709000202000203" pitchFamily="49" charset="0"/>
+                <a:ea typeface="+mj-ea"/>
+                <a:cs typeface="+mj-cs"/>
+              </a:rPr>
+              <a:t>│10 2 8│5 4│3 2 1│</a:t>
+            </a:r>
+          </a:p>
+          <a:p>
+            <a:r>
+              <a:rPr lang="en-GB" sz="2400" dirty="0">
+                <a:solidFill>
+                  <a:prstClr val="black"/>
+                </a:solidFill>
+                <a:latin typeface="APL385 Unicode" panose="020B0709000202000203" pitchFamily="49" charset="0"/>
+                <a:ea typeface="+mj-ea"/>
+                <a:cs typeface="+mj-cs"/>
+              </a:rPr>
+              <a:t>└~────→┴~─→┴~───→┘</a:t>
             </a:r>
           </a:p>
         </p:txBody>
@@ -5304,7 +5378,7 @@
         <p:spPr>
           <a:xfrm>
             <a:off x="696000" y="729000"/>
-            <a:ext cx="10800000" cy="3785652"/>
+            <a:ext cx="10800000" cy="4524315"/>
           </a:xfrm>
           <a:prstGeom prst="rect">
             <a:avLst/>
@@ -5464,6 +5538,40 @@
               </a:rPr>
               <a:t>3 6 9</a:t>
             </a:r>
+          </a:p>
+          <a:p>
+            <a:r>
+              <a:rPr lang="en-US" sz="2400" dirty="0">
+                <a:solidFill>
+                  <a:prstClr val="black"/>
+                </a:solidFill>
+                <a:latin typeface="APL385 Unicode" panose="020B0709000202000203" pitchFamily="49" charset="0"/>
+                <a:ea typeface="+mj-ea"/>
+                <a:cs typeface="+mj-cs"/>
+              </a:rPr>
+              <a:t>      'B' From (3 3⍴'ABC',3 5 1 3 4 2)</a:t>
+            </a:r>
+          </a:p>
+          <a:p>
+            <a:r>
+              <a:rPr lang="en-US" sz="2400" dirty="0">
+                <a:solidFill>
+                  <a:prstClr val="black"/>
+                </a:solidFill>
+                <a:latin typeface="APL385 Unicode" panose="020B0709000202000203" pitchFamily="49" charset="0"/>
+                <a:ea typeface="+mj-ea"/>
+                <a:cs typeface="+mj-cs"/>
+              </a:rPr>
+              <a:t>5 4</a:t>
+            </a:r>
+            <a:endParaRPr lang="en-GB" sz="2400" dirty="0">
+              <a:solidFill>
+                <a:prstClr val="black"/>
+              </a:solidFill>
+              <a:latin typeface="APL385 Unicode" panose="020B0709000202000203" pitchFamily="49" charset="0"/>
+              <a:ea typeface="+mj-ea"/>
+              <a:cs typeface="+mj-cs"/>
+            </a:endParaRPr>
           </a:p>
         </p:txBody>
       </p:sp>
@@ -5512,7 +5620,7 @@
         <p:spPr>
           <a:xfrm>
             <a:off x="696000" y="729000"/>
-            <a:ext cx="10800000" cy="3416320"/>
+            <a:ext cx="10800000" cy="4893647"/>
           </a:xfrm>
           <a:prstGeom prst="rect">
             <a:avLst/>
@@ -5751,6 +5859,154 @@
               </a:rPr>
               <a:t>0</a:t>
             </a:r>
+          </a:p>
+          <a:p>
+            <a:r>
+              <a:rPr lang="en-US" sz="2400" dirty="0">
+                <a:solidFill>
+                  <a:prstClr val="black"/>
+                </a:solidFill>
+                <a:latin typeface="APL385 Unicode" panose="020B0709000202000203" pitchFamily="49" charset="0"/>
+                <a:ea typeface="+mj-ea"/>
+                <a:cs typeface="+mj-cs"/>
+              </a:rPr>
+              <a:t>      'apple' </a:t>
+            </a:r>
+            <a:r>
+              <a:rPr lang="en-US" sz="2400" dirty="0" err="1">
+                <a:solidFill>
+                  <a:prstClr val="black"/>
+                </a:solidFill>
+                <a:latin typeface="APL385 Unicode" panose="020B0709000202000203" pitchFamily="49" charset="0"/>
+                <a:ea typeface="+mj-ea"/>
+                <a:cs typeface="+mj-cs"/>
+              </a:rPr>
+              <a:t>RotationOf</a:t>
+            </a:r>
+            <a:r>
+              <a:rPr lang="en-US" sz="2400" dirty="0">
+                <a:solidFill>
+                  <a:prstClr val="black"/>
+                </a:solidFill>
+                <a:latin typeface="APL385 Unicode" panose="020B0709000202000203" pitchFamily="49" charset="0"/>
+                <a:ea typeface="+mj-ea"/>
+                <a:cs typeface="+mj-cs"/>
+              </a:rPr>
+              <a:t> '</a:t>
+            </a:r>
+            <a:r>
+              <a:rPr lang="en-US" sz="2400" dirty="0" err="1">
+                <a:solidFill>
+                  <a:prstClr val="black"/>
+                </a:solidFill>
+                <a:latin typeface="APL385 Unicode" panose="020B0709000202000203" pitchFamily="49" charset="0"/>
+                <a:ea typeface="+mj-ea"/>
+                <a:cs typeface="+mj-cs"/>
+              </a:rPr>
+              <a:t>leapp</a:t>
+            </a:r>
+            <a:r>
+              <a:rPr lang="en-US" sz="2400" dirty="0">
+                <a:solidFill>
+                  <a:prstClr val="black"/>
+                </a:solidFill>
+                <a:latin typeface="APL385 Unicode" panose="020B0709000202000203" pitchFamily="49" charset="0"/>
+                <a:ea typeface="+mj-ea"/>
+                <a:cs typeface="+mj-cs"/>
+              </a:rPr>
+              <a:t>'</a:t>
+            </a:r>
+          </a:p>
+          <a:p>
+            <a:r>
+              <a:rPr lang="en-US" sz="2400" dirty="0">
+                <a:solidFill>
+                  <a:prstClr val="black"/>
+                </a:solidFill>
+                <a:latin typeface="APL385 Unicode" panose="020B0709000202000203" pitchFamily="49" charset="0"/>
+                <a:ea typeface="+mj-ea"/>
+                <a:cs typeface="+mj-cs"/>
+              </a:rPr>
+              <a:t>1</a:t>
+            </a:r>
+          </a:p>
+          <a:p>
+            <a:r>
+              <a:rPr lang="en-US" sz="2400" dirty="0">
+                <a:solidFill>
+                  <a:prstClr val="black"/>
+                </a:solidFill>
+                <a:latin typeface="APL385 Unicode" panose="020B0709000202000203" pitchFamily="49" charset="0"/>
+                <a:ea typeface="+mj-ea"/>
+                <a:cs typeface="+mj-cs"/>
+              </a:rPr>
+              <a:t>      'pepper' </a:t>
+            </a:r>
+            <a:r>
+              <a:rPr lang="en-US" sz="2400" dirty="0" err="1">
+                <a:solidFill>
+                  <a:prstClr val="black"/>
+                </a:solidFill>
+                <a:latin typeface="APL385 Unicode" panose="020B0709000202000203" pitchFamily="49" charset="0"/>
+                <a:ea typeface="+mj-ea"/>
+                <a:cs typeface="+mj-cs"/>
+              </a:rPr>
+              <a:t>RotationOf</a:t>
+            </a:r>
+            <a:r>
+              <a:rPr lang="en-US" sz="2400" dirty="0">
+                <a:solidFill>
+                  <a:prstClr val="black"/>
+                </a:solidFill>
+                <a:latin typeface="APL385 Unicode" panose="020B0709000202000203" pitchFamily="49" charset="0"/>
+                <a:ea typeface="+mj-ea"/>
+                <a:cs typeface="+mj-cs"/>
+              </a:rPr>
+              <a:t> '</a:t>
+            </a:r>
+            <a:r>
+              <a:rPr lang="en-US" sz="2400" dirty="0" err="1">
+                <a:solidFill>
+                  <a:prstClr val="black"/>
+                </a:solidFill>
+                <a:latin typeface="APL385 Unicode" panose="020B0709000202000203" pitchFamily="49" charset="0"/>
+                <a:ea typeface="+mj-ea"/>
+                <a:cs typeface="+mj-cs"/>
+              </a:rPr>
+              <a:t>repppe</a:t>
+            </a:r>
+            <a:r>
+              <a:rPr lang="en-US" sz="2400" dirty="0">
+                <a:solidFill>
+                  <a:prstClr val="black"/>
+                </a:solidFill>
+                <a:latin typeface="APL385 Unicode" panose="020B0709000202000203" pitchFamily="49" charset="0"/>
+                <a:ea typeface="+mj-ea"/>
+                <a:cs typeface="+mj-cs"/>
+              </a:rPr>
+              <a:t>'</a:t>
+            </a:r>
+          </a:p>
+          <a:p>
+            <a:r>
+              <a:rPr lang="en-US" sz="2400" dirty="0">
+                <a:solidFill>
+                  <a:prstClr val="black"/>
+                </a:solidFill>
+                <a:latin typeface="APL385 Unicode" panose="020B0709000202000203" pitchFamily="49" charset="0"/>
+                <a:ea typeface="+mj-ea"/>
+                <a:cs typeface="+mj-cs"/>
+              </a:rPr>
+              <a:t>0</a:t>
+            </a:r>
+            <a:endParaRPr lang="en-GB" sz="2400" dirty="0">
+              <a:solidFill>
+                <a:prstClr val="black"/>
+              </a:solidFill>
+              <a:latin typeface="APL385 Unicode" panose="020B0709000202000203" pitchFamily="49" charset="0"/>
+              <a:ea typeface="+mj-ea"/>
+              <a:cs typeface="+mj-cs"/>
+            </a:endParaRPr>
           </a:p>
         </p:txBody>
       </p:sp>

</xml_diff>